<commit_message>
Post Project Discussion Update
</commit_message>
<xml_diff>
--- a/ENGI301_project_proposal.pptx
+++ b/ENGI301_project_proposal.pptx
@@ -221,7 +221,7 @@
           <a:p>
             <a:fld id="{59041DB8-B66F-4DC8-A96E-33677E0F90FF}" type="datetimeFigureOut">
               <a:rPr lang="en-US" smtClean="0"/>
-              <a:t>10/4/2020</a:t>
+              <a:t>10/6/2020</a:t>
             </a:fld>
             <a:endParaRPr lang="en-US"/>
           </a:p>
@@ -386,7 +386,7 @@
           <a:p>
             <a:fld id="{DEB49C4A-65AC-492D-9701-81B46C3AD0E4}" type="datetimeFigureOut">
               <a:rPr lang="en-US" smtClean="0"/>
-              <a:t>10/4/2020</a:t>
+              <a:t>10/6/2020</a:t>
             </a:fld>
             <a:endParaRPr lang="en-US"/>
           </a:p>
@@ -3438,7 +3438,7 @@
           <a:p>
             <a:fld id="{384A29A4-78C8-47AB-BA06-22CB45938951}" type="datetime1">
               <a:rPr lang="en-US" smtClean="0"/>
-              <a:t>10/4/2020</a:t>
+              <a:t>10/6/2020</a:t>
             </a:fld>
             <a:endParaRPr lang="en-US"/>
           </a:p>
@@ -3633,7 +3633,7 @@
           <a:p>
             <a:fld id="{E1ED4ACF-2D82-46F2-A8E9-23963AA34E86}" type="datetime1">
               <a:rPr lang="en-US" smtClean="0"/>
-              <a:t>10/4/2020</a:t>
+              <a:t>10/6/2020</a:t>
             </a:fld>
             <a:endParaRPr lang="en-US"/>
           </a:p>
@@ -3827,7 +3827,7 @@
           <a:p>
             <a:fld id="{AE374B5B-21A0-4192-BF4C-38187F1A68D8}" type="datetime1">
               <a:rPr lang="en-US" smtClean="0"/>
-              <a:t>10/4/2020</a:t>
+              <a:t>10/6/2020</a:t>
             </a:fld>
             <a:endParaRPr lang="en-US"/>
           </a:p>
@@ -6168,7 +6168,7 @@
           <a:p>
             <a:fld id="{33B5CF7C-B333-48E1-A4A6-83A3C8B73AC0}" type="datetime1">
               <a:rPr lang="en-US" smtClean="0"/>
-              <a:t>10/4/2020</a:t>
+              <a:t>10/6/2020</a:t>
             </a:fld>
             <a:endParaRPr lang="en-US"/>
           </a:p>
@@ -6621,7 +6621,7 @@
           <a:p>
             <a:fld id="{AE320762-5CBF-4210-AB54-376B091119F8}" type="datetime1">
               <a:rPr lang="en-US" smtClean="0"/>
-              <a:t>10/4/2020</a:t>
+              <a:t>10/6/2020</a:t>
             </a:fld>
             <a:endParaRPr lang="en-US"/>
           </a:p>
@@ -6753,7 +6753,7 @@
           <a:p>
             <a:fld id="{7F0DB371-BF5F-4058-A212-1A908E4D2674}" type="datetime1">
               <a:rPr lang="en-US" smtClean="0"/>
-              <a:t>10/4/2020</a:t>
+              <a:t>10/6/2020</a:t>
             </a:fld>
             <a:endParaRPr lang="en-US"/>
           </a:p>
@@ -8686,7 +8686,7 @@
           <a:p>
             <a:fld id="{60A4083B-90AA-48CF-BAD5-00AA24D7F288}" type="datetime1">
               <a:rPr lang="en-US" smtClean="0"/>
-              <a:t>10/4/2020</a:t>
+              <a:t>10/6/2020</a:t>
             </a:fld>
             <a:endParaRPr lang="en-US"/>
           </a:p>
@@ -10945,7 +10945,7 @@
             <a:fld id="{F5BAF629-ECA2-4CF3-B790-9D9BDED98269}" type="datetime1">
               <a:rPr lang="en-US" smtClean="0"/>
               <a:pPr/>
-              <a:t>10/4/2020</a:t>
+              <a:t>10/6/2020</a:t>
             </a:fld>
             <a:endParaRPr lang="en-US"/>
           </a:p>
@@ -15240,7 +15240,7 @@
             <a:fld id="{B51B2453-8663-4C69-AF73-9FD7B1DEC5D0}" type="datetime1">
               <a:rPr lang="en-US" smtClean="0"/>
               <a:pPr/>
-              <a:t>10/4/2020</a:t>
+              <a:t>10/6/2020</a:t>
             </a:fld>
             <a:endParaRPr lang="en-US" dirty="0"/>
           </a:p>
@@ -16102,6 +16102,13 @@
               <a:t>When one goes too far away from the other, the phone is alerted</a:t>
             </a:r>
           </a:p>
+          <a:p>
+            <a:pPr lvl="1"/>
+            <a:r>
+              <a:rPr lang="en-US" dirty="0"/>
+              <a:t>BLE sensor: DSD TECH HM-10</a:t>
+            </a:r>
+          </a:p>
         </p:txBody>
       </p:sp>
       <p:pic>
@@ -16144,13 +16151,13 @@
   <p:clrMapOvr>
     <a:masterClrMapping/>
   </p:clrMapOvr>
-  <mc:AlternateContent xmlns:mc="http://schemas.openxmlformats.org/markup-compatibility/2006">
-    <mc:Choice xmlns:p14="http://schemas.microsoft.com/office/powerpoint/2010/main" Requires="p14">
+  <mc:AlternateContent xmlns:mc="http://schemas.openxmlformats.org/markup-compatibility/2006" xmlns:p14="http://schemas.microsoft.com/office/powerpoint/2010/main">
+    <mc:Choice Requires="p14">
       <p:transition spd="med" p14:dur="700">
         <p:fade/>
       </p:transition>
     </mc:Choice>
-    <mc:Fallback>
+    <mc:Fallback xmlns="">
       <p:transition spd="med">
         <p:fade/>
       </p:transition>
@@ -16340,13 +16347,13 @@
   <p:clrMapOvr>
     <a:masterClrMapping/>
   </p:clrMapOvr>
-  <mc:AlternateContent xmlns:mc="http://schemas.openxmlformats.org/markup-compatibility/2006">
-    <mc:Choice xmlns:p14="http://schemas.microsoft.com/office/powerpoint/2010/main" Requires="p14">
+  <mc:AlternateContent xmlns:mc="http://schemas.openxmlformats.org/markup-compatibility/2006" xmlns:p14="http://schemas.microsoft.com/office/powerpoint/2010/main">
+    <mc:Choice Requires="p14">
       <p:transition spd="med" p14:dur="700">
         <p:fade/>
       </p:transition>
     </mc:Choice>
-    <mc:Fallback>
+    <mc:Fallback xmlns="">
       <p:transition spd="med">
         <p:fade/>
       </p:transition>
@@ -16419,39 +16426,49 @@
         <p:spPr/>
         <p:txBody>
           <a:bodyPr>
-            <a:normAutofit/>
+            <a:normAutofit fontScale="92500" lnSpcReduction="10000"/>
           </a:bodyPr>
           <a:lstStyle/>
           <a:p>
             <a:r>
-              <a:rPr lang="en-US" dirty="0"/>
+              <a:rPr lang="en-US" dirty="0">
+                <a:latin typeface="+mj-lt"/>
+              </a:rPr>
               <a:t>Ways I can improve/change the tracking device:</a:t>
             </a:r>
           </a:p>
           <a:p>
             <a:pPr lvl="1"/>
             <a:r>
-              <a:rPr lang="en-US" dirty="0"/>
+              <a:rPr lang="en-US" dirty="0">
+                <a:latin typeface="+mj-lt"/>
+              </a:rPr>
               <a:t>Using calls/texts to notify user, no phone app</a:t>
             </a:r>
           </a:p>
           <a:p>
             <a:pPr lvl="1"/>
             <a:r>
-              <a:rPr lang="en-US" dirty="0"/>
+              <a:rPr lang="en-US" dirty="0">
+                <a:latin typeface="+mj-lt"/>
+              </a:rPr>
               <a:t>Can be powered externally</a:t>
             </a:r>
           </a:p>
           <a:p>
             <a:pPr lvl="1"/>
             <a:r>
-              <a:rPr lang="en-US" dirty="0"/>
+              <a:rPr lang="en-US" dirty="0">
+                <a:latin typeface="+mj-lt"/>
+              </a:rPr>
               <a:t>***More modifiable depending on the application</a:t>
             </a:r>
           </a:p>
           <a:p>
             <a:r>
-              <a:rPr lang="en-US" dirty="0"/>
+              <a:rPr lang="en-US" dirty="0">
+                <a:latin typeface="+mj-lt"/>
+              </a:rPr>
               <a:t>PB sources:</a:t>
             </a:r>
           </a:p>
@@ -16459,12 +16476,15 @@
             <a:pPr lvl="2"/>
             <a:r>
               <a:rPr lang="en-US" dirty="0">
+                <a:latin typeface="+mj-lt"/>
                 <a:hlinkClick r:id="rId3"/>
               </a:rPr>
               <a:t>https://www.digikey.com/en/articles/how-to-make-a-beaglebone-based-appliance-notification-texter</a:t>
             </a:r>
             <a:r>
-              <a:rPr lang="en-US" dirty="0"/>
+              <a:rPr lang="en-US" dirty="0">
+                <a:latin typeface="+mj-lt"/>
+              </a:rPr>
               <a:t> - Guide for text alerts</a:t>
             </a:r>
           </a:p>
@@ -16472,35 +16492,113 @@
             <a:pPr lvl="2"/>
             <a:r>
               <a:rPr lang="en-US" dirty="0">
+                <a:latin typeface="+mj-lt"/>
                 <a:hlinkClick r:id="rId4"/>
               </a:rPr>
               <a:t>https://www.teachmemicro.com/pocketbeagle-wifi/</a:t>
             </a:r>
             <a:r>
-              <a:rPr lang="en-US" dirty="0"/>
+              <a:rPr lang="en-US" dirty="0">
+                <a:latin typeface="+mj-lt"/>
+              </a:rPr>
               <a:t> - Guide for adding </a:t>
             </a:r>
             <a:r>
-              <a:rPr lang="en-US" dirty="0" err="1"/>
+              <a:rPr lang="en-US" dirty="0" err="1">
+                <a:latin typeface="+mj-lt"/>
+              </a:rPr>
               <a:t>wifi</a:t>
             </a:r>
-            <a:endParaRPr lang="en-US" dirty="0"/>
+            <a:endParaRPr lang="en-US" dirty="0">
+              <a:latin typeface="+mj-lt"/>
+            </a:endParaRPr>
+          </a:p>
+          <a:p>
+            <a:r>
+              <a:rPr lang="en-US" dirty="0">
+                <a:latin typeface="+mj-lt"/>
+              </a:rPr>
+              <a:t>How to relocate device?</a:t>
+            </a:r>
           </a:p>
           <a:p>
             <a:pPr lvl="1"/>
-            <a:endParaRPr lang="en-US" dirty="0"/>
+            <a:r>
+              <a:rPr lang="en-US" dirty="0">
+                <a:latin typeface="+mj-lt"/>
+              </a:rPr>
+              <a:t>GPS (Useful info: </a:t>
+            </a:r>
+            <a:r>
+              <a:rPr lang="en-US" dirty="0">
+                <a:hlinkClick r:id="rId5"/>
+              </a:rPr>
+              <a:t>https://drive.google.com/file/d/1dSdSLoo4JpHFd8qM0BEkE5fvYLP2yZlh/view</a:t>
+            </a:r>
+            <a:r>
+              <a:rPr lang="en-US" b="0" i="0" dirty="0">
+                <a:solidFill>
+                  <a:srgbClr val="111111"/>
+                </a:solidFill>
+                <a:effectLst/>
+                <a:latin typeface="+mj-lt"/>
+              </a:rPr>
+              <a:t>)</a:t>
+            </a:r>
+          </a:p>
+          <a:p>
+            <a:pPr lvl="2"/>
+            <a:r>
+              <a:rPr lang="en-US" dirty="0">
+                <a:latin typeface="+mj-lt"/>
+              </a:rPr>
+              <a:t>GPS Module: GT-U7</a:t>
+            </a:r>
+          </a:p>
+          <a:p>
+            <a:pPr lvl="1"/>
+            <a:r>
+              <a:rPr lang="en-US" dirty="0">
+                <a:latin typeface="+mj-lt"/>
+              </a:rPr>
+              <a:t>LEDs/Speaker if desired</a:t>
+            </a:r>
+          </a:p>
+          <a:p>
+            <a:r>
+              <a:rPr lang="en-US" dirty="0">
+                <a:latin typeface="+mj-lt"/>
+              </a:rPr>
+              <a:t>I will be prototyping with </a:t>
+            </a:r>
+            <a:r>
+              <a:rPr lang="en-US" dirty="0" err="1">
+                <a:latin typeface="+mj-lt"/>
+              </a:rPr>
+              <a:t>WiFi</a:t>
+            </a:r>
+            <a:r>
+              <a:rPr lang="en-US" dirty="0">
+                <a:latin typeface="+mj-lt"/>
+              </a:rPr>
+              <a:t>, but a cellular modem can be used in the future</a:t>
+            </a:r>
           </a:p>
           <a:p>
             <a:pPr marL="274320" lvl="1" indent="0">
               <a:buNone/>
             </a:pPr>
-            <a:endParaRPr lang="en-US" dirty="0"/>
+            <a:endParaRPr lang="en-US" dirty="0">
+              <a:latin typeface="+mj-lt"/>
+            </a:endParaRPr>
           </a:p>
           <a:p>
             <a:pPr marL="274320" lvl="1" indent="0">
               <a:buNone/>
             </a:pPr>
-            <a:endParaRPr lang="en-US" dirty="0"/>
+            <a:endParaRPr lang="en-US" dirty="0">
+              <a:latin typeface="+mj-lt"/>
+            </a:endParaRPr>
           </a:p>
         </p:txBody>
       </p:sp>
@@ -16514,13 +16612,13 @@
   <p:clrMapOvr>
     <a:masterClrMapping/>
   </p:clrMapOvr>
-  <mc:AlternateContent xmlns:mc="http://schemas.openxmlformats.org/markup-compatibility/2006">
-    <mc:Choice xmlns:p14="http://schemas.microsoft.com/office/powerpoint/2010/main" Requires="p14">
+  <mc:AlternateContent xmlns:mc="http://schemas.openxmlformats.org/markup-compatibility/2006" xmlns:p14="http://schemas.microsoft.com/office/powerpoint/2010/main">
+    <mc:Choice Requires="p14">
       <p:transition spd="med" p14:dur="700">
         <p:fade/>
       </p:transition>
     </mc:Choice>
-    <mc:Fallback>
+    <mc:Fallback xmlns="">
       <p:transition spd="med">
         <p:fade/>
       </p:transition>
@@ -16638,7 +16736,7 @@
         </p:nvSpPr>
         <p:spPr>
           <a:xfrm>
-            <a:off x="3467100" y="2098020"/>
+            <a:off x="3416302" y="1773833"/>
             <a:ext cx="1485900" cy="685800"/>
           </a:xfrm>
           <a:prstGeom prst="rect">
@@ -16687,7 +16785,7 @@
         </p:nvCxnSpPr>
         <p:spPr>
           <a:xfrm>
-            <a:off x="4210050" y="2098020"/>
+            <a:off x="4159252" y="1773833"/>
             <a:ext cx="0" cy="685800"/>
           </a:xfrm>
           <a:prstGeom prst="line">
@@ -16726,7 +16824,7 @@
         </p:nvCxnSpPr>
         <p:spPr>
           <a:xfrm flipH="1">
-            <a:off x="4210049" y="2440920"/>
+            <a:off x="4159251" y="2116733"/>
             <a:ext cx="742951" cy="0"/>
           </a:xfrm>
           <a:prstGeom prst="line">
@@ -16762,7 +16860,7 @@
         </p:nvSpPr>
         <p:spPr>
           <a:xfrm>
-            <a:off x="3523966" y="2310115"/>
+            <a:off x="3473168" y="1985928"/>
             <a:ext cx="649537" cy="261610"/>
           </a:xfrm>
           <a:prstGeom prst="rect">
@@ -16797,7 +16895,7 @@
         </p:nvSpPr>
         <p:spPr>
           <a:xfrm>
-            <a:off x="4362450" y="2458481"/>
+            <a:off x="4311652" y="2134294"/>
             <a:ext cx="413896" cy="307777"/>
           </a:xfrm>
           <a:prstGeom prst="rect">
@@ -16832,7 +16930,7 @@
         </p:nvSpPr>
         <p:spPr>
           <a:xfrm>
-            <a:off x="5867400" y="2065010"/>
+            <a:off x="5816602" y="1740823"/>
             <a:ext cx="2400300" cy="751820"/>
           </a:xfrm>
           <a:prstGeom prst="rect">
@@ -16863,13 +16961,6 @@
               <a:t>DSD TECH HM-10</a:t>
             </a:r>
           </a:p>
-          <a:p>
-            <a:pPr algn="ctr"/>
-            <a:r>
-              <a:rPr lang="en-US" sz="1100" i="1" dirty="0"/>
-              <a:t>Note: This component is designed for Arduino</a:t>
-            </a:r>
-          </a:p>
         </p:txBody>
       </p:sp>
       <p:cxnSp>
@@ -16888,7 +16979,7 @@
         </p:nvCxnSpPr>
         <p:spPr>
           <a:xfrm>
-            <a:off x="4914900" y="2287031"/>
+            <a:off x="4864102" y="1962844"/>
             <a:ext cx="952500" cy="0"/>
           </a:xfrm>
           <a:prstGeom prst="line">
@@ -16924,7 +17015,7 @@
         </p:nvSpPr>
         <p:spPr>
           <a:xfrm>
-            <a:off x="4362450" y="2133143"/>
+            <a:off x="4311652" y="1808956"/>
             <a:ext cx="685800" cy="307777"/>
           </a:xfrm>
           <a:prstGeom prst="rect">
@@ -16961,7 +17052,7 @@
         </p:nvCxnSpPr>
         <p:spPr>
           <a:xfrm>
-            <a:off x="4876800" y="2612369"/>
+            <a:off x="4826002" y="2288182"/>
             <a:ext cx="990600" cy="0"/>
           </a:xfrm>
           <a:prstGeom prst="line">
@@ -16997,7 +17088,7 @@
         </p:nvSpPr>
         <p:spPr>
           <a:xfrm>
-            <a:off x="9811034" y="2133143"/>
+            <a:off x="9760236" y="1808956"/>
             <a:ext cx="1981200" cy="642610"/>
           </a:xfrm>
           <a:prstGeom prst="roundRect">
@@ -17049,7 +17140,7 @@
         </p:nvCxnSpPr>
         <p:spPr>
           <a:xfrm>
-            <a:off x="8267700" y="2440920"/>
+            <a:off x="8216902" y="2116733"/>
             <a:ext cx="1543334" cy="0"/>
           </a:xfrm>
           <a:prstGeom prst="line">
@@ -17085,7 +17176,7 @@
         </p:nvSpPr>
         <p:spPr>
           <a:xfrm>
-            <a:off x="8411954" y="2089149"/>
+            <a:off x="8361156" y="1764962"/>
             <a:ext cx="1159292" cy="369332"/>
           </a:xfrm>
           <a:prstGeom prst="rect">
@@ -17349,6 +17440,354 @@
           <a:xfrm>
             <a:off x="2247900" y="4949706"/>
             <a:ext cx="664360" cy="0"/>
+          </a:xfrm>
+          <a:prstGeom prst="line">
+            <a:avLst/>
+          </a:prstGeom>
+        </p:spPr>
+        <p:style>
+          <a:lnRef idx="1">
+            <a:schemeClr val="dk1"/>
+          </a:lnRef>
+          <a:fillRef idx="0">
+            <a:schemeClr val="dk1"/>
+          </a:fillRef>
+          <a:effectRef idx="0">
+            <a:schemeClr val="dk1"/>
+          </a:effectRef>
+          <a:fontRef idx="minor">
+            <a:schemeClr val="tx1"/>
+          </a:fontRef>
+        </p:style>
+      </p:cxnSp>
+      <p:sp>
+        <p:nvSpPr>
+          <p:cNvPr id="36" name="Rectangle 35">
+            <a:extLst>
+              <a:ext uri="{FF2B5EF4-FFF2-40B4-BE49-F238E27FC236}">
+                <a16:creationId xmlns:a16="http://schemas.microsoft.com/office/drawing/2014/main" id="{7BC4BAC3-C06E-42C7-BC88-BCE87B4C7B5F}"/>
+              </a:ext>
+            </a:extLst>
+          </p:cNvPr>
+          <p:cNvSpPr/>
+          <p:nvPr/>
+        </p:nvSpPr>
+        <p:spPr>
+          <a:xfrm>
+            <a:off x="3416302" y="2586969"/>
+            <a:ext cx="1485900" cy="685800"/>
+          </a:xfrm>
+          <a:prstGeom prst="rect">
+            <a:avLst/>
+          </a:prstGeom>
+        </p:spPr>
+        <p:style>
+          <a:lnRef idx="2">
+            <a:schemeClr val="accent3">
+              <a:shade val="50000"/>
+            </a:schemeClr>
+          </a:lnRef>
+          <a:fillRef idx="1">
+            <a:schemeClr val="accent3"/>
+          </a:fillRef>
+          <a:effectRef idx="0">
+            <a:schemeClr val="accent3"/>
+          </a:effectRef>
+          <a:fontRef idx="minor">
+            <a:schemeClr val="lt1"/>
+          </a:fontRef>
+        </p:style>
+        <p:txBody>
+          <a:bodyPr rtlCol="0" anchor="ctr"/>
+          <a:lstStyle/>
+          <a:p>
+            <a:pPr algn="ctr"/>
+            <a:endParaRPr lang="en-US" dirty="0"/>
+          </a:p>
+        </p:txBody>
+      </p:sp>
+      <p:cxnSp>
+        <p:nvCxnSpPr>
+          <p:cNvPr id="41" name="Straight Connector 40">
+            <a:extLst>
+              <a:ext uri="{FF2B5EF4-FFF2-40B4-BE49-F238E27FC236}">
+                <a16:creationId xmlns:a16="http://schemas.microsoft.com/office/drawing/2014/main" id="{3BD9A3F8-32F6-462F-B2F3-197DBD47A951}"/>
+              </a:ext>
+            </a:extLst>
+          </p:cNvPr>
+          <p:cNvCxnSpPr>
+            <a:stCxn id="36" idx="0"/>
+            <a:endCxn id="36" idx="2"/>
+          </p:cNvCxnSpPr>
+          <p:nvPr/>
+        </p:nvCxnSpPr>
+        <p:spPr>
+          <a:xfrm>
+            <a:off x="4159252" y="2586969"/>
+            <a:ext cx="0" cy="685800"/>
+          </a:xfrm>
+          <a:prstGeom prst="line">
+            <a:avLst/>
+          </a:prstGeom>
+        </p:spPr>
+        <p:style>
+          <a:lnRef idx="1">
+            <a:schemeClr val="dk1"/>
+          </a:lnRef>
+          <a:fillRef idx="0">
+            <a:schemeClr val="dk1"/>
+          </a:fillRef>
+          <a:effectRef idx="0">
+            <a:schemeClr val="dk1"/>
+          </a:effectRef>
+          <a:fontRef idx="minor">
+            <a:schemeClr val="tx1"/>
+          </a:fontRef>
+        </p:style>
+      </p:cxnSp>
+      <p:cxnSp>
+        <p:nvCxnSpPr>
+          <p:cNvPr id="44" name="Straight Connector 43">
+            <a:extLst>
+              <a:ext uri="{FF2B5EF4-FFF2-40B4-BE49-F238E27FC236}">
+                <a16:creationId xmlns:a16="http://schemas.microsoft.com/office/drawing/2014/main" id="{D6D1EC2A-CBC6-4FC5-858C-2AE20E2D0D99}"/>
+              </a:ext>
+            </a:extLst>
+          </p:cNvPr>
+          <p:cNvCxnSpPr>
+            <a:cxnSpLocks/>
+            <a:stCxn id="36" idx="3"/>
+          </p:cNvCxnSpPr>
+          <p:nvPr/>
+        </p:nvCxnSpPr>
+        <p:spPr>
+          <a:xfrm flipH="1">
+            <a:off x="4159251" y="2929869"/>
+            <a:ext cx="742951" cy="0"/>
+          </a:xfrm>
+          <a:prstGeom prst="line">
+            <a:avLst/>
+          </a:prstGeom>
+        </p:spPr>
+        <p:style>
+          <a:lnRef idx="1">
+            <a:schemeClr val="dk1"/>
+          </a:lnRef>
+          <a:fillRef idx="0">
+            <a:schemeClr val="dk1"/>
+          </a:fillRef>
+          <a:effectRef idx="0">
+            <a:schemeClr val="dk1"/>
+          </a:effectRef>
+          <a:fontRef idx="minor">
+            <a:schemeClr val="tx1"/>
+          </a:fontRef>
+        </p:style>
+      </p:cxnSp>
+      <p:sp>
+        <p:nvSpPr>
+          <p:cNvPr id="45" name="TextBox 44">
+            <a:extLst>
+              <a:ext uri="{FF2B5EF4-FFF2-40B4-BE49-F238E27FC236}">
+                <a16:creationId xmlns:a16="http://schemas.microsoft.com/office/drawing/2014/main" id="{CB34BD23-9B3B-4CDA-BEA9-1D6F8E776ECD}"/>
+              </a:ext>
+            </a:extLst>
+          </p:cNvPr>
+          <p:cNvSpPr txBox="1"/>
+          <p:nvPr/>
+        </p:nvSpPr>
+        <p:spPr>
+          <a:xfrm>
+            <a:off x="3473168" y="2799064"/>
+            <a:ext cx="649537" cy="261610"/>
+          </a:xfrm>
+          <a:prstGeom prst="rect">
+            <a:avLst/>
+          </a:prstGeom>
+          <a:noFill/>
+        </p:spPr>
+        <p:txBody>
+          <a:bodyPr wrap="none" rtlCol="0">
+            <a:spAutoFit/>
+          </a:bodyPr>
+          <a:lstStyle/>
+          <a:p>
+            <a:r>
+              <a:rPr lang="en-US" sz="1100" dirty="0"/>
+              <a:t>UART2</a:t>
+            </a:r>
+          </a:p>
+        </p:txBody>
+      </p:sp>
+      <p:sp>
+        <p:nvSpPr>
+          <p:cNvPr id="46" name="TextBox 45">
+            <a:extLst>
+              <a:ext uri="{FF2B5EF4-FFF2-40B4-BE49-F238E27FC236}">
+                <a16:creationId xmlns:a16="http://schemas.microsoft.com/office/drawing/2014/main" id="{57A607B6-E819-431D-AEB5-E510B1D64DA0}"/>
+              </a:ext>
+            </a:extLst>
+          </p:cNvPr>
+          <p:cNvSpPr txBox="1"/>
+          <p:nvPr/>
+        </p:nvSpPr>
+        <p:spPr>
+          <a:xfrm>
+            <a:off x="4311652" y="2947430"/>
+            <a:ext cx="413896" cy="307777"/>
+          </a:xfrm>
+          <a:prstGeom prst="rect">
+            <a:avLst/>
+          </a:prstGeom>
+          <a:noFill/>
+        </p:spPr>
+        <p:txBody>
+          <a:bodyPr wrap="none" rtlCol="0">
+            <a:spAutoFit/>
+          </a:bodyPr>
+          <a:lstStyle/>
+          <a:p>
+            <a:r>
+              <a:rPr lang="en-US" sz="1400" dirty="0"/>
+              <a:t>TX</a:t>
+            </a:r>
+          </a:p>
+        </p:txBody>
+      </p:sp>
+      <p:sp>
+        <p:nvSpPr>
+          <p:cNvPr id="47" name="TextBox 46">
+            <a:extLst>
+              <a:ext uri="{FF2B5EF4-FFF2-40B4-BE49-F238E27FC236}">
+                <a16:creationId xmlns:a16="http://schemas.microsoft.com/office/drawing/2014/main" id="{1DD88A07-4036-4A56-B7C9-077F1B57CD27}"/>
+              </a:ext>
+            </a:extLst>
+          </p:cNvPr>
+          <p:cNvSpPr txBox="1"/>
+          <p:nvPr/>
+        </p:nvSpPr>
+        <p:spPr>
+          <a:xfrm>
+            <a:off x="4311652" y="2622092"/>
+            <a:ext cx="685800" cy="307777"/>
+          </a:xfrm>
+          <a:prstGeom prst="rect">
+            <a:avLst/>
+          </a:prstGeom>
+          <a:noFill/>
+        </p:spPr>
+        <p:txBody>
+          <a:bodyPr wrap="square">
+            <a:spAutoFit/>
+          </a:bodyPr>
+          <a:lstStyle/>
+          <a:p>
+            <a:r>
+              <a:rPr lang="en-US" sz="1400" dirty="0"/>
+              <a:t>RX</a:t>
+            </a:r>
+          </a:p>
+        </p:txBody>
+      </p:sp>
+      <p:sp>
+        <p:nvSpPr>
+          <p:cNvPr id="4" name="Rectangle 3">
+            <a:extLst>
+              <a:ext uri="{FF2B5EF4-FFF2-40B4-BE49-F238E27FC236}">
+                <a16:creationId xmlns:a16="http://schemas.microsoft.com/office/drawing/2014/main" id="{94B92F76-6C63-414C-BFC4-41AC96F8FE78}"/>
+              </a:ext>
+            </a:extLst>
+          </p:cNvPr>
+          <p:cNvSpPr/>
+          <p:nvPr/>
+        </p:nvSpPr>
+        <p:spPr>
+          <a:xfrm>
+            <a:off x="5918728" y="2680730"/>
+            <a:ext cx="2259548" cy="533400"/>
+          </a:xfrm>
+          <a:prstGeom prst="rect">
+            <a:avLst/>
+          </a:prstGeom>
+        </p:spPr>
+        <p:style>
+          <a:lnRef idx="1">
+            <a:schemeClr val="accent4"/>
+          </a:lnRef>
+          <a:fillRef idx="2">
+            <a:schemeClr val="accent4"/>
+          </a:fillRef>
+          <a:effectRef idx="1">
+            <a:schemeClr val="accent4"/>
+          </a:effectRef>
+          <a:fontRef idx="minor">
+            <a:schemeClr val="dk1"/>
+          </a:fontRef>
+        </p:style>
+        <p:txBody>
+          <a:bodyPr rtlCol="0" anchor="ctr"/>
+          <a:lstStyle/>
+          <a:p>
+            <a:pPr algn="ctr"/>
+            <a:r>
+              <a:rPr lang="en-US" dirty="0"/>
+              <a:t>GT-U7</a:t>
+            </a:r>
+          </a:p>
+        </p:txBody>
+      </p:sp>
+      <p:cxnSp>
+        <p:nvCxnSpPr>
+          <p:cNvPr id="7" name="Straight Connector 6">
+            <a:extLst>
+              <a:ext uri="{FF2B5EF4-FFF2-40B4-BE49-F238E27FC236}">
+                <a16:creationId xmlns:a16="http://schemas.microsoft.com/office/drawing/2014/main" id="{D72B2ADA-0747-484D-BB21-DC51E5E59F0E}"/>
+              </a:ext>
+            </a:extLst>
+          </p:cNvPr>
+          <p:cNvCxnSpPr/>
+          <p:nvPr/>
+        </p:nvCxnSpPr>
+        <p:spPr>
+          <a:xfrm>
+            <a:off x="4864102" y="2799064"/>
+            <a:ext cx="1054626" cy="0"/>
+          </a:xfrm>
+          <a:prstGeom prst="line">
+            <a:avLst/>
+          </a:prstGeom>
+        </p:spPr>
+        <p:style>
+          <a:lnRef idx="1">
+            <a:schemeClr val="dk1"/>
+          </a:lnRef>
+          <a:fillRef idx="0">
+            <a:schemeClr val="dk1"/>
+          </a:fillRef>
+          <a:effectRef idx="0">
+            <a:schemeClr val="dk1"/>
+          </a:effectRef>
+          <a:fontRef idx="minor">
+            <a:schemeClr val="tx1"/>
+          </a:fontRef>
+        </p:style>
+      </p:cxnSp>
+      <p:cxnSp>
+        <p:nvCxnSpPr>
+          <p:cNvPr id="51" name="Straight Connector 50">
+            <a:extLst>
+              <a:ext uri="{FF2B5EF4-FFF2-40B4-BE49-F238E27FC236}">
+                <a16:creationId xmlns:a16="http://schemas.microsoft.com/office/drawing/2014/main" id="{702C6789-86E9-4D0D-9951-B85CB7AD2367}"/>
+              </a:ext>
+            </a:extLst>
+          </p:cNvPr>
+          <p:cNvCxnSpPr/>
+          <p:nvPr/>
+        </p:nvCxnSpPr>
+        <p:spPr>
+          <a:xfrm>
+            <a:off x="4864102" y="3060674"/>
+            <a:ext cx="1054626" cy="0"/>
           </a:xfrm>
           <a:prstGeom prst="line">
             <a:avLst/>
@@ -17534,13 +17973,6 @@
               <a:t>DSD TECH HM-10</a:t>
             </a:r>
           </a:p>
-          <a:p>
-            <a:pPr algn="ctr"/>
-            <a:r>
-              <a:rPr lang="en-US" sz="1100" i="1" dirty="0"/>
-              <a:t>Note: This component is designed for Arduino</a:t>
-            </a:r>
-          </a:p>
         </p:txBody>
       </p:sp>
       <p:sp>
@@ -17913,6 +18345,129 @@
           </a:fontRef>
         </p:style>
       </p:cxnSp>
+      <p:sp>
+        <p:nvSpPr>
+          <p:cNvPr id="3" name="Rectangle 2">
+            <a:extLst>
+              <a:ext uri="{FF2B5EF4-FFF2-40B4-BE49-F238E27FC236}">
+                <a16:creationId xmlns:a16="http://schemas.microsoft.com/office/drawing/2014/main" id="{DB58A5D5-6DC7-4357-89C7-9594BF45A0B7}"/>
+              </a:ext>
+            </a:extLst>
+          </p:cNvPr>
+          <p:cNvSpPr/>
+          <p:nvPr/>
+        </p:nvSpPr>
+        <p:spPr>
+          <a:xfrm>
+            <a:off x="9465836" y="2942472"/>
+            <a:ext cx="2259548" cy="533400"/>
+          </a:xfrm>
+          <a:prstGeom prst="rect">
+            <a:avLst/>
+          </a:prstGeom>
+        </p:spPr>
+        <p:style>
+          <a:lnRef idx="1">
+            <a:schemeClr val="accent4"/>
+          </a:lnRef>
+          <a:fillRef idx="2">
+            <a:schemeClr val="accent4"/>
+          </a:fillRef>
+          <a:effectRef idx="1">
+            <a:schemeClr val="accent4"/>
+          </a:effectRef>
+          <a:fontRef idx="minor">
+            <a:schemeClr val="dk1"/>
+          </a:fontRef>
+        </p:style>
+        <p:txBody>
+          <a:bodyPr rtlCol="0" anchor="ctr"/>
+          <a:lstStyle/>
+          <a:p>
+            <a:pPr algn="ctr"/>
+            <a:r>
+              <a:rPr lang="en-US" dirty="0"/>
+              <a:t>GT-U7</a:t>
+            </a:r>
+          </a:p>
+        </p:txBody>
+      </p:sp>
+      <p:cxnSp>
+        <p:nvCxnSpPr>
+          <p:cNvPr id="8" name="Straight Connector 7">
+            <a:extLst>
+              <a:ext uri="{FF2B5EF4-FFF2-40B4-BE49-F238E27FC236}">
+                <a16:creationId xmlns:a16="http://schemas.microsoft.com/office/drawing/2014/main" id="{9B5B1154-3900-4929-84CB-3A958620E44A}"/>
+              </a:ext>
+            </a:extLst>
+          </p:cNvPr>
+          <p:cNvCxnSpPr>
+            <a:endCxn id="3" idx="1"/>
+          </p:cNvCxnSpPr>
+          <p:nvPr/>
+        </p:nvCxnSpPr>
+        <p:spPr>
+          <a:xfrm>
+            <a:off x="8877300" y="3209172"/>
+            <a:ext cx="588536" cy="0"/>
+          </a:xfrm>
+          <a:prstGeom prst="line">
+            <a:avLst/>
+          </a:prstGeom>
+        </p:spPr>
+        <p:style>
+          <a:lnRef idx="1">
+            <a:schemeClr val="dk1"/>
+          </a:lnRef>
+          <a:fillRef idx="0">
+            <a:schemeClr val="dk1"/>
+          </a:fillRef>
+          <a:effectRef idx="0">
+            <a:schemeClr val="dk1"/>
+          </a:effectRef>
+          <a:fontRef idx="minor">
+            <a:schemeClr val="tx1"/>
+          </a:fontRef>
+        </p:style>
+      </p:cxnSp>
+      <p:cxnSp>
+        <p:nvCxnSpPr>
+          <p:cNvPr id="19" name="Straight Connector 18">
+            <a:extLst>
+              <a:ext uri="{FF2B5EF4-FFF2-40B4-BE49-F238E27FC236}">
+                <a16:creationId xmlns:a16="http://schemas.microsoft.com/office/drawing/2014/main" id="{16F4A82B-C8E7-4BED-8D89-48B3D8BFDC24}"/>
+              </a:ext>
+            </a:extLst>
+          </p:cNvPr>
+          <p:cNvCxnSpPr>
+            <a:cxnSpLocks/>
+          </p:cNvCxnSpPr>
+          <p:nvPr/>
+        </p:nvCxnSpPr>
+        <p:spPr>
+          <a:xfrm flipV="1">
+            <a:off x="8877300" y="2266246"/>
+            <a:ext cx="0" cy="942926"/>
+          </a:xfrm>
+          <a:prstGeom prst="line">
+            <a:avLst/>
+          </a:prstGeom>
+        </p:spPr>
+        <p:style>
+          <a:lnRef idx="1">
+            <a:schemeClr val="accent1"/>
+          </a:lnRef>
+          <a:fillRef idx="0">
+            <a:schemeClr val="accent1"/>
+          </a:fillRef>
+          <a:effectRef idx="0">
+            <a:schemeClr val="accent1"/>
+          </a:effectRef>
+          <a:fontRef idx="minor">
+            <a:schemeClr val="tx1"/>
+          </a:fontRef>
+        </p:style>
+      </p:cxnSp>
     </p:spTree>
     <p:extLst>
       <p:ext uri="{BB962C8B-B14F-4D97-AF65-F5344CB8AC3E}">
@@ -17999,14 +18554,14 @@
             <p:ph idx="1"/>
             <p:extLst>
               <p:ext uri="{D42A27DB-BD31-4B8C-83A1-F6EECF244321}">
-                <p14:modId xmlns:p14="http://schemas.microsoft.com/office/powerpoint/2010/main" val="773753282"/>
+                <p14:modId xmlns:p14="http://schemas.microsoft.com/office/powerpoint/2010/main" val="4170129283"/>
               </p:ext>
             </p:extLst>
           </p:nvPr>
         </p:nvGraphicFramePr>
         <p:xfrm>
           <a:off x="609600" y="1295400"/>
-          <a:ext cx="10972800" cy="5394960"/>
+          <a:ext cx="10972800" cy="4930140"/>
         </p:xfrm>
         <a:graphic>
           <a:graphicData uri="http://schemas.openxmlformats.org/drawingml/2006/table">
@@ -18083,15 +18638,21 @@
                   </a:ext>
                 </a:extLst>
               </a:tr>
-              <a:tr h="1464067">
+              <a:tr h="1272540">
                 <a:tc>
                   <a:txBody>
                     <a:bodyPr/>
                     <a:lstStyle/>
                     <a:p>
                       <a:r>
+                        <a:rPr lang="en-US" b="1" dirty="0"/>
+                        <a:t>Bluetooth Beacon </a:t>
+                      </a:r>
+                    </a:p>
+                    <a:p>
+                      <a:r>
                         <a:rPr lang="en-US" dirty="0"/>
-                        <a:t>Bluetooth Beacon (</a:t>
+                        <a:t>(</a:t>
                       </a:r>
                       <a:r>
                         <a:rPr lang="en-US" dirty="0">
@@ -18102,15 +18663,6 @@
                       <a:r>
                         <a:rPr lang="en-US" dirty="0"/>
                         <a:t>)</a:t>
-                      </a:r>
-                    </a:p>
-                    <a:p>
-                      <a:endParaRPr lang="en-US" dirty="0"/>
-                    </a:p>
-                    <a:p>
-                      <a:r>
-                        <a:rPr lang="en-US" dirty="0"/>
-                        <a:t>Question – Can this sensor sense range?</a:t>
                       </a:r>
                     </a:p>
                   </a:txBody>
@@ -18148,43 +18700,21 @@
                   </a:ext>
                 </a:extLst>
               </a:tr>
-              <a:tr h="1232899">
+              <a:tr h="563880">
                 <a:tc>
                   <a:txBody>
                     <a:bodyPr/>
                     <a:lstStyle/>
                     <a:p>
                       <a:r>
-                        <a:rPr lang="en-US" dirty="0" err="1"/>
-                        <a:t>WiFi</a:t>
+                        <a:rPr lang="en-US" b="1" dirty="0"/>
+                        <a:t>GPS Module </a:t>
                       </a:r>
-                      <a:r>
-                        <a:rPr lang="en-US" dirty="0"/>
-                        <a:t> Adapter - </a:t>
-                      </a:r>
-                      <a:r>
-                        <a:rPr lang="en-US" dirty="0">
-                          <a:hlinkClick r:id="rId3"/>
-                        </a:rPr>
-                        <a:t>https://www.amazon.ca/Cudy-650Mbps-Adapter-Wireless-Desktop/dp/B07RN44SHW/ref=sr_1_11?dchild=1&amp;keywords=wifi+adapter&amp;qid=1601865280&amp;s=electronics&amp;sr=1-11</a:t>
-                      </a:r>
-                      <a:endParaRPr lang="en-US" dirty="0"/>
-                    </a:p>
-                    <a:p>
-                      <a:endParaRPr lang="en-US" dirty="0"/>
                     </a:p>
                     <a:p>
                       <a:r>
                         <a:rPr lang="en-US" dirty="0"/>
-                        <a:t>Question – Will this </a:t>
-                      </a:r>
-                      <a:r>
-                        <a:rPr lang="en-US" dirty="0" err="1"/>
-                        <a:t>WiFi</a:t>
-                      </a:r>
-                      <a:r>
-                        <a:rPr lang="en-US" dirty="0"/>
-                        <a:t> adapter be compatible with Linux?</a:t>
+                        <a:t>(https://www.amazon.com/Microcontroller-Compatible-Sensitivity-Navigation-Positioning/dp/B07P8YMVNT/ref=sr_1_3?dchild=1&amp;keywords=GPS+module&amp;qid=1602041167&amp;sr=8-3)</a:t>
                       </a:r>
                     </a:p>
                   </a:txBody>
@@ -18210,7 +18740,7 @@
                     <a:p>
                       <a:r>
                         <a:rPr lang="en-US" dirty="0"/>
-                        <a:t>$12.73</a:t>
+                        <a:t>$12.99</a:t>
                       </a:r>
                     </a:p>
                   </a:txBody>
@@ -18228,9 +18758,30 @@
                     <a:bodyPr/>
                     <a:lstStyle/>
                     <a:p>
+                      <a:pPr marL="0" marR="0" lvl="0" indent="0" algn="l" defTabSz="914400" rtl="0" eaLnBrk="1" fontAlgn="auto" latinLnBrk="0" hangingPunct="1">
+                        <a:lnSpc>
+                          <a:spcPct val="100000"/>
+                        </a:lnSpc>
+                        <a:spcBef>
+                          <a:spcPts val="0"/>
+                        </a:spcBef>
+                        <a:spcAft>
+                          <a:spcPts val="0"/>
+                        </a:spcAft>
+                        <a:buClrTx/>
+                        <a:buSzTx/>
+                        <a:buFontTx/>
+                        <a:buNone/>
+                        <a:tabLst/>
+                        <a:defRPr/>
+                      </a:pPr>
+                      <a:r>
+                        <a:rPr lang="en-US" dirty="0" err="1"/>
+                        <a:t>WiFi</a:t>
+                      </a:r>
                       <a:r>
                         <a:rPr lang="en-US" dirty="0"/>
-                        <a:t>USB adapter (Already have?)</a:t>
+                        <a:t> Adapter – Provided</a:t>
                       </a:r>
                     </a:p>
                   </a:txBody>

</xml_diff>